<commit_message>
Updates to code and ppt
</commit_message>
<xml_diff>
--- a/final_presentation.pptx
+++ b/final_presentation.pptx
@@ -8274,11 +8274,7 @@
             </a:pPr>
             <a:r>
               <a:rPr lang="en-US" sz="1800" dirty="0" smtClean="0"/>
-              <a:t>Impute for </a:t>
-            </a:r>
-            <a:r>
-              <a:rPr lang="en-US" sz="1800" smtClean="0"/>
-              <a:t>unmatched tracks</a:t>
+              <a:t>Impute for unmatched tracks, incorporate tag value</a:t>
             </a:r>
             <a:endParaRPr lang="en-US" sz="1800" dirty="0" smtClean="0"/>
           </a:p>

</xml_diff>